<commit_message>
Updated ppt to include feature coefficient description
</commit_message>
<xml_diff>
--- a/Project1_DataScience.pptx
+++ b/Project1_DataScience.pptx
@@ -5,7 +5,7 @@
     <p:sldMasterId id="2147483648" r:id="rId1"/>
   </p:sldMasterIdLst>
   <p:notesMasterIdLst>
-    <p:notesMasterId r:id="rId8"/>
+    <p:notesMasterId r:id="rId9"/>
   </p:notesMasterIdLst>
   <p:sldIdLst>
     <p:sldId id="256" r:id="rId2"/>
@@ -13,7 +13,8 @@
     <p:sldId id="280" r:id="rId4"/>
     <p:sldId id="287" r:id="rId5"/>
     <p:sldId id="264" r:id="rId6"/>
-    <p:sldId id="279" r:id="rId7"/>
+    <p:sldId id="288" r:id="rId7"/>
+    <p:sldId id="279" r:id="rId8"/>
   </p:sldIdLst>
   <p:sldSz cx="9144000" cy="6858000" type="screen4x3"/>
   <p:notesSz cx="6858000" cy="9144000"/>
@@ -213,7 +214,7 @@
           <a:p>
             <a:fld id="{A0FBF6AA-5758-6147-902C-5D5EED94F0DA}" type="datetimeFigureOut">
               <a:rPr lang="en-US" smtClean="0"/>
-              <a:t>12/15/18</a:t>
+              <a:t>2/8/19</a:t>
             </a:fld>
             <a:endParaRPr lang="en-US"/>
           </a:p>
@@ -662,7 +663,7 @@
           <a:p>
             <a:fld id="{476F3844-A7B0-42E8-B11B-DB21BB0185F0}" type="datetimeFigureOut">
               <a:rPr lang="en-US" smtClean="0"/>
-              <a:t>12/15/18</a:t>
+              <a:t>2/8/19</a:t>
             </a:fld>
             <a:endParaRPr lang="en-US"/>
           </a:p>
@@ -832,7 +833,7 @@
           <a:p>
             <a:fld id="{476F3844-A7B0-42E8-B11B-DB21BB0185F0}" type="datetimeFigureOut">
               <a:rPr lang="en-US" smtClean="0"/>
-              <a:t>12/15/18</a:t>
+              <a:t>2/8/19</a:t>
             </a:fld>
             <a:endParaRPr lang="en-US"/>
           </a:p>
@@ -1012,7 +1013,7 @@
           <a:p>
             <a:fld id="{476F3844-A7B0-42E8-B11B-DB21BB0185F0}" type="datetimeFigureOut">
               <a:rPr lang="en-US" smtClean="0"/>
-              <a:t>12/15/18</a:t>
+              <a:t>2/8/19</a:t>
             </a:fld>
             <a:endParaRPr lang="en-US"/>
           </a:p>
@@ -1182,7 +1183,7 @@
           <a:p>
             <a:fld id="{476F3844-A7B0-42E8-B11B-DB21BB0185F0}" type="datetimeFigureOut">
               <a:rPr lang="en-US" smtClean="0"/>
-              <a:t>12/15/18</a:t>
+              <a:t>2/8/19</a:t>
             </a:fld>
             <a:endParaRPr lang="en-US"/>
           </a:p>
@@ -1428,7 +1429,7 @@
           <a:p>
             <a:fld id="{476F3844-A7B0-42E8-B11B-DB21BB0185F0}" type="datetimeFigureOut">
               <a:rPr lang="en-US" smtClean="0"/>
-              <a:t>12/15/18</a:t>
+              <a:t>2/8/19</a:t>
             </a:fld>
             <a:endParaRPr lang="en-US"/>
           </a:p>
@@ -1716,7 +1717,7 @@
           <a:p>
             <a:fld id="{476F3844-A7B0-42E8-B11B-DB21BB0185F0}" type="datetimeFigureOut">
               <a:rPr lang="en-US" smtClean="0"/>
-              <a:t>12/15/18</a:t>
+              <a:t>2/8/19</a:t>
             </a:fld>
             <a:endParaRPr lang="en-US"/>
           </a:p>
@@ -2138,7 +2139,7 @@
           <a:p>
             <a:fld id="{476F3844-A7B0-42E8-B11B-DB21BB0185F0}" type="datetimeFigureOut">
               <a:rPr lang="en-US" smtClean="0"/>
-              <a:t>12/15/18</a:t>
+              <a:t>2/8/19</a:t>
             </a:fld>
             <a:endParaRPr lang="en-US"/>
           </a:p>
@@ -2256,7 +2257,7 @@
           <a:p>
             <a:fld id="{476F3844-A7B0-42E8-B11B-DB21BB0185F0}" type="datetimeFigureOut">
               <a:rPr lang="en-US" smtClean="0"/>
-              <a:t>12/15/18</a:t>
+              <a:t>2/8/19</a:t>
             </a:fld>
             <a:endParaRPr lang="en-US"/>
           </a:p>
@@ -2351,7 +2352,7 @@
           <a:p>
             <a:fld id="{476F3844-A7B0-42E8-B11B-DB21BB0185F0}" type="datetimeFigureOut">
               <a:rPr lang="en-US" smtClean="0"/>
-              <a:t>12/15/18</a:t>
+              <a:t>2/8/19</a:t>
             </a:fld>
             <a:endParaRPr lang="en-US"/>
           </a:p>
@@ -2628,7 +2629,7 @@
           <a:p>
             <a:fld id="{476F3844-A7B0-42E8-B11B-DB21BB0185F0}" type="datetimeFigureOut">
               <a:rPr lang="en-US" smtClean="0"/>
-              <a:t>12/15/18</a:t>
+              <a:t>2/8/19</a:t>
             </a:fld>
             <a:endParaRPr lang="en-US"/>
           </a:p>
@@ -2881,7 +2882,7 @@
           <a:p>
             <a:fld id="{476F3844-A7B0-42E8-B11B-DB21BB0185F0}" type="datetimeFigureOut">
               <a:rPr lang="en-US" smtClean="0"/>
-              <a:t>12/15/18</a:t>
+              <a:t>2/8/19</a:t>
             </a:fld>
             <a:endParaRPr lang="en-US"/>
           </a:p>
@@ -3094,7 +3095,7 @@
           <a:p>
             <a:fld id="{476F3844-A7B0-42E8-B11B-DB21BB0185F0}" type="datetimeFigureOut">
               <a:rPr lang="en-US" smtClean="0"/>
-              <a:t>12/15/18</a:t>
+              <a:t>2/8/19</a:t>
             </a:fld>
             <a:endParaRPr lang="en-US"/>
           </a:p>
@@ -3596,7 +3597,6 @@
               <a:rPr lang="en-US" dirty="0" smtClean="0"/>
               <a:t>Solution</a:t>
             </a:r>
-            <a:endParaRPr lang="en-US" dirty="0" smtClean="0"/>
           </a:p>
           <a:p>
             <a:pPr lvl="1"/>
@@ -4789,7 +4789,7 @@
         </p:nvSpPr>
         <p:spPr>
           <a:xfrm>
-            <a:off x="304800" y="3665968"/>
+            <a:off x="337457" y="3498570"/>
             <a:ext cx="8382000" cy="1077218"/>
           </a:xfrm>
           <a:prstGeom prst="rect">
@@ -4899,6 +4899,106 @@
               </a:rPr>
               <a:t> 4.51e03yr_b + 3.7e04sqft_liv15</a:t>
             </a:r>
+            <a:endParaRPr lang="en-US" sz="1600" dirty="0">
+              <a:solidFill>
+                <a:srgbClr val="24292E"/>
+              </a:solidFill>
+              <a:latin typeface="-apple-system" charset="0"/>
+            </a:endParaRPr>
+          </a:p>
+        </p:txBody>
+      </p:sp>
+      <p:sp>
+        <p:nvSpPr>
+          <p:cNvPr id="6" name="Rectangle 5"/>
+          <p:cNvSpPr/>
+          <p:nvPr/>
+        </p:nvSpPr>
+        <p:spPr>
+          <a:xfrm>
+            <a:off x="333829" y="4887397"/>
+            <a:ext cx="8382000" cy="830997"/>
+          </a:xfrm>
+          <a:prstGeom prst="rect">
+            <a:avLst/>
+          </a:prstGeom>
+        </p:spPr>
+        <p:txBody>
+          <a:bodyPr wrap="square">
+            <a:spAutoFit/>
+          </a:bodyPr>
+          <a:lstStyle/>
+          <a:p>
+            <a:pPr marL="0" marR="0" lvl="0" indent="0" defTabSz="914400" eaLnBrk="1" fontAlgn="auto" latinLnBrk="0" hangingPunct="1">
+              <a:lnSpc>
+                <a:spcPct val="100000"/>
+              </a:lnSpc>
+              <a:spcBef>
+                <a:spcPts val="0"/>
+              </a:spcBef>
+              <a:spcAft>
+                <a:spcPts val="0"/>
+              </a:spcAft>
+              <a:buClrTx/>
+              <a:buSzTx/>
+              <a:buFont typeface="Arial" charset="0"/>
+              <a:buNone/>
+              <a:tabLst/>
+              <a:defRPr/>
+            </a:pPr>
+            <a:r>
+              <a:rPr lang="en-US" sz="1600" b="1" dirty="0" smtClean="0">
+                <a:solidFill>
+                  <a:srgbClr val="24292E"/>
+                </a:solidFill>
+                <a:latin typeface="-apple-system" charset="0"/>
+              </a:rPr>
+              <a:t>Explanation and Recommendations: </a:t>
+            </a:r>
+          </a:p>
+          <a:p>
+            <a:pPr marL="0" marR="0" lvl="0" indent="0" defTabSz="914400" eaLnBrk="1" fontAlgn="auto" latinLnBrk="0" hangingPunct="1">
+              <a:lnSpc>
+                <a:spcPct val="100000"/>
+              </a:lnSpc>
+              <a:spcBef>
+                <a:spcPts val="0"/>
+              </a:spcBef>
+              <a:spcAft>
+                <a:spcPts val="0"/>
+              </a:spcAft>
+              <a:buClrTx/>
+              <a:buSzTx/>
+              <a:buFont typeface="Arial" charset="0"/>
+              <a:buNone/>
+              <a:tabLst/>
+              <a:defRPr/>
+            </a:pPr>
+            <a:endParaRPr lang="en-US" sz="1600" b="1" dirty="0">
+              <a:solidFill>
+                <a:srgbClr val="24292E"/>
+              </a:solidFill>
+              <a:latin typeface="-apple-system" charset="0"/>
+            </a:endParaRPr>
+          </a:p>
+          <a:p>
+            <a:pPr marL="0" marR="0" lvl="0" indent="0" defTabSz="914400" eaLnBrk="1" fontAlgn="auto" latinLnBrk="0" hangingPunct="1">
+              <a:lnSpc>
+                <a:spcPct val="100000"/>
+              </a:lnSpc>
+              <a:spcBef>
+                <a:spcPts val="0"/>
+              </a:spcBef>
+              <a:spcAft>
+                <a:spcPts val="0"/>
+              </a:spcAft>
+              <a:buClrTx/>
+              <a:buSzTx/>
+              <a:buFont typeface="Arial" charset="0"/>
+              <a:buNone/>
+              <a:tabLst/>
+              <a:defRPr/>
+            </a:pPr>
             <a:endParaRPr lang="en-US" sz="1600" dirty="0">
               <a:solidFill>
                 <a:srgbClr val="24292E"/>
@@ -4962,6 +5062,94 @@
           <a:p>
             <a:r>
               <a:rPr lang="en-US" dirty="0" smtClean="0"/>
+              <a:t>Explanations of features</a:t>
+            </a:r>
+            <a:endParaRPr lang="en-US" dirty="0"/>
+          </a:p>
+        </p:txBody>
+      </p:sp>
+      <p:pic>
+        <p:nvPicPr>
+          <p:cNvPr id="4" name="Content Placeholder 3"/>
+          <p:cNvPicPr>
+            <a:picLocks noGrp="1" noChangeAspect="1"/>
+          </p:cNvPicPr>
+          <p:nvPr>
+            <p:ph idx="1"/>
+          </p:nvPr>
+        </p:nvPicPr>
+        <p:blipFill rotWithShape="1">
+          <a:blip r:embed="rId2">
+            <a:extLst>
+              <a:ext uri="{28A0092B-C50C-407E-A947-70E740481C1C}">
+                <a14:useLocalDpi xmlns:a14="http://schemas.microsoft.com/office/drawing/2010/main" val="0"/>
+              </a:ext>
+            </a:extLst>
+          </a:blip>
+          <a:srcRect r="4033"/>
+          <a:stretch/>
+        </p:blipFill>
+        <p:spPr>
+          <a:xfrm>
+            <a:off x="0" y="1676400"/>
+            <a:ext cx="9067800" cy="3569800"/>
+          </a:xfrm>
+        </p:spPr>
+      </p:pic>
+    </p:spTree>
+    <p:extLst>
+      <p:ext uri="{BB962C8B-B14F-4D97-AF65-F5344CB8AC3E}">
+        <p14:creationId xmlns:p14="http://schemas.microsoft.com/office/powerpoint/2010/main" val="1520150676"/>
+      </p:ext>
+    </p:extLst>
+  </p:cSld>
+  <p:clrMapOvr>
+    <a:masterClrMapping/>
+  </p:clrMapOvr>
+  <p:timing>
+    <p:tnLst>
+      <p:par>
+        <p:cTn id="1" dur="indefinite" restart="never" nodeType="tmRoot"/>
+      </p:par>
+    </p:tnLst>
+  </p:timing>
+</p:sld>
+</file>
+
+<file path=ppt/slides/slide7.xml><?xml version="1.0" encoding="utf-8"?>
+<p:sld xmlns:a="http://schemas.openxmlformats.org/drawingml/2006/main" xmlns:r="http://schemas.openxmlformats.org/officeDocument/2006/relationships" xmlns:p="http://schemas.openxmlformats.org/presentationml/2006/main">
+  <p:cSld>
+    <p:spTree>
+      <p:nvGrpSpPr>
+        <p:cNvPr id="1" name=""/>
+        <p:cNvGrpSpPr/>
+        <p:nvPr/>
+      </p:nvGrpSpPr>
+      <p:grpSpPr>
+        <a:xfrm>
+          <a:off x="0" y="0"/>
+          <a:ext cx="0" cy="0"/>
+          <a:chOff x="0" y="0"/>
+          <a:chExt cx="0" cy="0"/>
+        </a:xfrm>
+      </p:grpSpPr>
+      <p:sp>
+        <p:nvSpPr>
+          <p:cNvPr id="2" name="Title 1"/>
+          <p:cNvSpPr>
+            <a:spLocks noGrp="1"/>
+          </p:cNvSpPr>
+          <p:nvPr>
+            <p:ph type="title"/>
+          </p:nvPr>
+        </p:nvSpPr>
+        <p:spPr/>
+        <p:txBody>
+          <a:bodyPr/>
+          <a:lstStyle/>
+          <a:p>
+            <a:r>
+              <a:rPr lang="en-US" dirty="0" smtClean="0"/>
               <a:t>END</a:t>
             </a:r>
             <a:endParaRPr lang="en-US" dirty="0"/>
@@ -5001,6 +5189,13 @@
   <p:clrMapOvr>
     <a:masterClrMapping/>
   </p:clrMapOvr>
+  <p:timing>
+    <p:tnLst>
+      <p:par>
+        <p:cTn id="1" dur="indefinite" restart="never" nodeType="tmRoot"/>
+      </p:par>
+    </p:tnLst>
+  </p:timing>
 </p:sld>
 </file>
 

</xml_diff>

<commit_message>
Updated slide with new recommendation
</commit_message>
<xml_diff>
--- a/Project1_DataScience.pptx
+++ b/Project1_DataScience.pptx
@@ -5,7 +5,7 @@
     <p:sldMasterId id="2147483648" r:id="rId1"/>
   </p:sldMasterIdLst>
   <p:notesMasterIdLst>
-    <p:notesMasterId r:id="rId9"/>
+    <p:notesMasterId r:id="rId8"/>
   </p:notesMasterIdLst>
   <p:sldIdLst>
     <p:sldId id="256" r:id="rId2"/>
@@ -14,7 +14,6 @@
     <p:sldId id="287" r:id="rId5"/>
     <p:sldId id="264" r:id="rId6"/>
     <p:sldId id="288" r:id="rId7"/>
-    <p:sldId id="279" r:id="rId8"/>
   </p:sldIdLst>
   <p:sldSz cx="9144000" cy="6858000" type="screen4x3"/>
   <p:notesSz cx="6858000" cy="9144000"/>
@@ -214,7 +213,7 @@
           <a:p>
             <a:fld id="{A0FBF6AA-5758-6147-902C-5D5EED94F0DA}" type="datetimeFigureOut">
               <a:rPr lang="en-US" smtClean="0"/>
-              <a:t>2/8/19</a:t>
+              <a:t>2/10/19</a:t>
             </a:fld>
             <a:endParaRPr lang="en-US"/>
           </a:p>
@@ -663,7 +662,7 @@
           <a:p>
             <a:fld id="{476F3844-A7B0-42E8-B11B-DB21BB0185F0}" type="datetimeFigureOut">
               <a:rPr lang="en-US" smtClean="0"/>
-              <a:t>2/8/19</a:t>
+              <a:t>2/10/19</a:t>
             </a:fld>
             <a:endParaRPr lang="en-US"/>
           </a:p>
@@ -833,7 +832,7 @@
           <a:p>
             <a:fld id="{476F3844-A7B0-42E8-B11B-DB21BB0185F0}" type="datetimeFigureOut">
               <a:rPr lang="en-US" smtClean="0"/>
-              <a:t>2/8/19</a:t>
+              <a:t>2/10/19</a:t>
             </a:fld>
             <a:endParaRPr lang="en-US"/>
           </a:p>
@@ -1013,7 +1012,7 @@
           <a:p>
             <a:fld id="{476F3844-A7B0-42E8-B11B-DB21BB0185F0}" type="datetimeFigureOut">
               <a:rPr lang="en-US" smtClean="0"/>
-              <a:t>2/8/19</a:t>
+              <a:t>2/10/19</a:t>
             </a:fld>
             <a:endParaRPr lang="en-US"/>
           </a:p>
@@ -1183,7 +1182,7 @@
           <a:p>
             <a:fld id="{476F3844-A7B0-42E8-B11B-DB21BB0185F0}" type="datetimeFigureOut">
               <a:rPr lang="en-US" smtClean="0"/>
-              <a:t>2/8/19</a:t>
+              <a:t>2/10/19</a:t>
             </a:fld>
             <a:endParaRPr lang="en-US"/>
           </a:p>
@@ -1429,7 +1428,7 @@
           <a:p>
             <a:fld id="{476F3844-A7B0-42E8-B11B-DB21BB0185F0}" type="datetimeFigureOut">
               <a:rPr lang="en-US" smtClean="0"/>
-              <a:t>2/8/19</a:t>
+              <a:t>2/10/19</a:t>
             </a:fld>
             <a:endParaRPr lang="en-US"/>
           </a:p>
@@ -1717,7 +1716,7 @@
           <a:p>
             <a:fld id="{476F3844-A7B0-42E8-B11B-DB21BB0185F0}" type="datetimeFigureOut">
               <a:rPr lang="en-US" smtClean="0"/>
-              <a:t>2/8/19</a:t>
+              <a:t>2/10/19</a:t>
             </a:fld>
             <a:endParaRPr lang="en-US"/>
           </a:p>
@@ -2139,7 +2138,7 @@
           <a:p>
             <a:fld id="{476F3844-A7B0-42E8-B11B-DB21BB0185F0}" type="datetimeFigureOut">
               <a:rPr lang="en-US" smtClean="0"/>
-              <a:t>2/8/19</a:t>
+              <a:t>2/10/19</a:t>
             </a:fld>
             <a:endParaRPr lang="en-US"/>
           </a:p>
@@ -2257,7 +2256,7 @@
           <a:p>
             <a:fld id="{476F3844-A7B0-42E8-B11B-DB21BB0185F0}" type="datetimeFigureOut">
               <a:rPr lang="en-US" smtClean="0"/>
-              <a:t>2/8/19</a:t>
+              <a:t>2/10/19</a:t>
             </a:fld>
             <a:endParaRPr lang="en-US"/>
           </a:p>
@@ -2352,7 +2351,7 @@
           <a:p>
             <a:fld id="{476F3844-A7B0-42E8-B11B-DB21BB0185F0}" type="datetimeFigureOut">
               <a:rPr lang="en-US" smtClean="0"/>
-              <a:t>2/8/19</a:t>
+              <a:t>2/10/19</a:t>
             </a:fld>
             <a:endParaRPr lang="en-US"/>
           </a:p>
@@ -2629,7 +2628,7 @@
           <a:p>
             <a:fld id="{476F3844-A7B0-42E8-B11B-DB21BB0185F0}" type="datetimeFigureOut">
               <a:rPr lang="en-US" smtClean="0"/>
-              <a:t>2/8/19</a:t>
+              <a:t>2/10/19</a:t>
             </a:fld>
             <a:endParaRPr lang="en-US"/>
           </a:p>
@@ -2882,7 +2881,7 @@
           <a:p>
             <a:fld id="{476F3844-A7B0-42E8-B11B-DB21BB0185F0}" type="datetimeFigureOut">
               <a:rPr lang="en-US" smtClean="0"/>
-              <a:t>2/8/19</a:t>
+              <a:t>2/10/19</a:t>
             </a:fld>
             <a:endParaRPr lang="en-US"/>
           </a:p>
@@ -3095,7 +3094,7 @@
           <a:p>
             <a:fld id="{476F3844-A7B0-42E8-B11B-DB21BB0185F0}" type="datetimeFigureOut">
               <a:rPr lang="en-US" smtClean="0"/>
-              <a:t>2/8/19</a:t>
+              <a:t>2/10/19</a:t>
             </a:fld>
             <a:endParaRPr lang="en-US"/>
           </a:p>
@@ -5070,119 +5069,32 @@
       </p:sp>
       <p:pic>
         <p:nvPicPr>
-          <p:cNvPr id="4" name="Content Placeholder 3"/>
+          <p:cNvPr id="5" name="Picture 4"/>
           <p:cNvPicPr>
-            <a:picLocks noGrp="1" noChangeAspect="1"/>
+            <a:picLocks noChangeAspect="1"/>
           </p:cNvPicPr>
-          <p:nvPr>
-            <p:ph idx="1"/>
-          </p:nvPr>
+          <p:nvPr/>
         </p:nvPicPr>
-        <p:blipFill rotWithShape="1">
-          <a:blip r:embed="rId2">
-            <a:extLst>
-              <a:ext uri="{28A0092B-C50C-407E-A947-70E740481C1C}">
-                <a14:useLocalDpi xmlns:a14="http://schemas.microsoft.com/office/drawing/2010/main" val="0"/>
-              </a:ext>
-            </a:extLst>
-          </a:blip>
-          <a:srcRect r="4033"/>
-          <a:stretch/>
+        <p:blipFill>
+          <a:blip r:embed="rId2"/>
+          <a:stretch>
+            <a:fillRect/>
+          </a:stretch>
         </p:blipFill>
         <p:spPr>
           <a:xfrm>
-            <a:off x="0" y="1676400"/>
-            <a:ext cx="9067800" cy="3569800"/>
+            <a:off x="0" y="1632561"/>
+            <a:ext cx="9144000" cy="3592878"/>
           </a:xfrm>
+          <a:prstGeom prst="rect">
+            <a:avLst/>
+          </a:prstGeom>
         </p:spPr>
       </p:pic>
     </p:spTree>
     <p:extLst>
       <p:ext uri="{BB962C8B-B14F-4D97-AF65-F5344CB8AC3E}">
         <p14:creationId xmlns:p14="http://schemas.microsoft.com/office/powerpoint/2010/main" val="1520150676"/>
-      </p:ext>
-    </p:extLst>
-  </p:cSld>
-  <p:clrMapOvr>
-    <a:masterClrMapping/>
-  </p:clrMapOvr>
-  <p:timing>
-    <p:tnLst>
-      <p:par>
-        <p:cTn id="1" dur="indefinite" restart="never" nodeType="tmRoot"/>
-      </p:par>
-    </p:tnLst>
-  </p:timing>
-</p:sld>
-</file>
-
-<file path=ppt/slides/slide7.xml><?xml version="1.0" encoding="utf-8"?>
-<p:sld xmlns:a="http://schemas.openxmlformats.org/drawingml/2006/main" xmlns:r="http://schemas.openxmlformats.org/officeDocument/2006/relationships" xmlns:p="http://schemas.openxmlformats.org/presentationml/2006/main">
-  <p:cSld>
-    <p:spTree>
-      <p:nvGrpSpPr>
-        <p:cNvPr id="1" name=""/>
-        <p:cNvGrpSpPr/>
-        <p:nvPr/>
-      </p:nvGrpSpPr>
-      <p:grpSpPr>
-        <a:xfrm>
-          <a:off x="0" y="0"/>
-          <a:ext cx="0" cy="0"/>
-          <a:chOff x="0" y="0"/>
-          <a:chExt cx="0" cy="0"/>
-        </a:xfrm>
-      </p:grpSpPr>
-      <p:sp>
-        <p:nvSpPr>
-          <p:cNvPr id="2" name="Title 1"/>
-          <p:cNvSpPr>
-            <a:spLocks noGrp="1"/>
-          </p:cNvSpPr>
-          <p:nvPr>
-            <p:ph type="title"/>
-          </p:nvPr>
-        </p:nvSpPr>
-        <p:spPr/>
-        <p:txBody>
-          <a:bodyPr/>
-          <a:lstStyle/>
-          <a:p>
-            <a:r>
-              <a:rPr lang="en-US" dirty="0" smtClean="0"/>
-              <a:t>END</a:t>
-            </a:r>
-            <a:endParaRPr lang="en-US" dirty="0"/>
-          </a:p>
-        </p:txBody>
-      </p:sp>
-      <p:sp>
-        <p:nvSpPr>
-          <p:cNvPr id="3" name="Content Placeholder 2"/>
-          <p:cNvSpPr>
-            <a:spLocks noGrp="1"/>
-          </p:cNvSpPr>
-          <p:nvPr>
-            <p:ph idx="1"/>
-          </p:nvPr>
-        </p:nvSpPr>
-        <p:spPr/>
-        <p:txBody>
-          <a:bodyPr/>
-          <a:lstStyle/>
-          <a:p>
-            <a:r>
-              <a:rPr lang="en-US" dirty="0" smtClean="0"/>
-              <a:t>Comments</a:t>
-            </a:r>
-            <a:endParaRPr lang="en-US" dirty="0"/>
-          </a:p>
-        </p:txBody>
-      </p:sp>
-    </p:spTree>
-    <p:extLst>
-      <p:ext uri="{BB962C8B-B14F-4D97-AF65-F5344CB8AC3E}">
-        <p14:creationId xmlns:p14="http://schemas.microsoft.com/office/powerpoint/2010/main" val="3738743156"/>
       </p:ext>
     </p:extLst>
   </p:cSld>

</xml_diff>